<commit_message>
Add slides for extensions
Add slide deck to explain the extensions for composed and complex things
</commit_message>
<xml_diff>
--- a/sdf.pptx
+++ b/sdf.pptx
@@ -214,7 +214,7 @@
           <a:p>
             <a:fld id="{87815133-5011-0A4E-8AFB-AF8A05293C5C}" type="datetimeFigureOut">
               <a:rPr lang="en-US" smtClean="0"/>
-              <a:t>5/3/19</a:t>
+              <a:t>5/13/19</a:t>
             </a:fld>
             <a:endParaRPr lang="en-US"/>
           </a:p>
@@ -612,7 +612,7 @@
           <a:p>
             <a:fld id="{FAD9FDEC-58D2-A243-A58A-A2FAAE8B11EB}" type="datetimeFigureOut">
               <a:rPr lang="en-US" smtClean="0"/>
-              <a:t>5/3/19</a:t>
+              <a:t>5/13/19</a:t>
             </a:fld>
             <a:endParaRPr lang="en-US"/>
           </a:p>
@@ -777,7 +777,7 @@
           <a:p>
             <a:fld id="{FAD9FDEC-58D2-A243-A58A-A2FAAE8B11EB}" type="datetimeFigureOut">
               <a:rPr lang="en-US" smtClean="0"/>
-              <a:t>5/3/19</a:t>
+              <a:t>5/13/19</a:t>
             </a:fld>
             <a:endParaRPr lang="en-US"/>
           </a:p>
@@ -952,7 +952,7 @@
           <a:p>
             <a:fld id="{FAD9FDEC-58D2-A243-A58A-A2FAAE8B11EB}" type="datetimeFigureOut">
               <a:rPr lang="en-US" smtClean="0"/>
-              <a:t>5/3/19</a:t>
+              <a:t>5/13/19</a:t>
             </a:fld>
             <a:endParaRPr lang="en-US"/>
           </a:p>
@@ -1117,7 +1117,7 @@
           <a:p>
             <a:fld id="{FAD9FDEC-58D2-A243-A58A-A2FAAE8B11EB}" type="datetimeFigureOut">
               <a:rPr lang="en-US" smtClean="0"/>
-              <a:t>5/3/19</a:t>
+              <a:t>5/13/19</a:t>
             </a:fld>
             <a:endParaRPr lang="en-US"/>
           </a:p>
@@ -1356,7 +1356,7 @@
           <a:p>
             <a:fld id="{FAD9FDEC-58D2-A243-A58A-A2FAAE8B11EB}" type="datetimeFigureOut">
               <a:rPr lang="en-US" smtClean="0"/>
-              <a:t>5/3/19</a:t>
+              <a:t>5/13/19</a:t>
             </a:fld>
             <a:endParaRPr lang="en-US"/>
           </a:p>
@@ -1583,7 +1583,7 @@
           <a:p>
             <a:fld id="{FAD9FDEC-58D2-A243-A58A-A2FAAE8B11EB}" type="datetimeFigureOut">
               <a:rPr lang="en-US" smtClean="0"/>
-              <a:t>5/3/19</a:t>
+              <a:t>5/13/19</a:t>
             </a:fld>
             <a:endParaRPr lang="en-US"/>
           </a:p>
@@ -1945,7 +1945,7 @@
           <a:p>
             <a:fld id="{FAD9FDEC-58D2-A243-A58A-A2FAAE8B11EB}" type="datetimeFigureOut">
               <a:rPr lang="en-US" smtClean="0"/>
-              <a:t>5/3/19</a:t>
+              <a:t>5/13/19</a:t>
             </a:fld>
             <a:endParaRPr lang="en-US"/>
           </a:p>
@@ -2058,7 +2058,7 @@
           <a:p>
             <a:fld id="{FAD9FDEC-58D2-A243-A58A-A2FAAE8B11EB}" type="datetimeFigureOut">
               <a:rPr lang="en-US" smtClean="0"/>
-              <a:t>5/3/19</a:t>
+              <a:t>5/13/19</a:t>
             </a:fld>
             <a:endParaRPr lang="en-US"/>
           </a:p>
@@ -2148,7 +2148,7 @@
           <a:p>
             <a:fld id="{FAD9FDEC-58D2-A243-A58A-A2FAAE8B11EB}" type="datetimeFigureOut">
               <a:rPr lang="en-US" smtClean="0"/>
-              <a:t>5/3/19</a:t>
+              <a:t>5/13/19</a:t>
             </a:fld>
             <a:endParaRPr lang="en-US"/>
           </a:p>
@@ -2420,7 +2420,7 @@
           <a:p>
             <a:fld id="{FAD9FDEC-58D2-A243-A58A-A2FAAE8B11EB}" type="datetimeFigureOut">
               <a:rPr lang="en-US" smtClean="0"/>
-              <a:t>5/3/19</a:t>
+              <a:t>5/13/19</a:t>
             </a:fld>
             <a:endParaRPr lang="en-US"/>
           </a:p>
@@ -2672,7 +2672,7 @@
           <a:p>
             <a:fld id="{FAD9FDEC-58D2-A243-A58A-A2FAAE8B11EB}" type="datetimeFigureOut">
               <a:rPr lang="en-US" smtClean="0"/>
-              <a:t>5/3/19</a:t>
+              <a:t>5/13/19</a:t>
             </a:fld>
             <a:endParaRPr lang="en-US"/>
           </a:p>
@@ -2880,7 +2880,7 @@
           <a:p>
             <a:fld id="{FAD9FDEC-58D2-A243-A58A-A2FAAE8B11EB}" type="datetimeFigureOut">
               <a:rPr lang="en-US" smtClean="0"/>
-              <a:t>5/3/19</a:t>
+              <a:t>5/13/19</a:t>
             </a:fld>
             <a:endParaRPr lang="en-US"/>
           </a:p>
@@ -3380,7 +3380,7 @@
           <p:cNvPr id="2" name="Title 1">
             <a:extLst>
               <a:ext uri="{FF2B5EF4-FFF2-40B4-BE49-F238E27FC236}">
-                <a16:creationId xmlns:a16="http://schemas.microsoft.com/office/drawing/2014/main" id="{A3F07EF7-F8E3-DB4C-9FA1-321A48FFAC33}"/>
+                <a16:creationId xmlns:a16="http://schemas.microsoft.com/office/drawing/2014/main" xmlns="" id="{A3F07EF7-F8E3-DB4C-9FA1-321A48FFAC33}"/>
               </a:ext>
             </a:extLst>
           </p:cNvPr>
@@ -3408,7 +3408,7 @@
           <p:cNvPr id="3" name="Content Placeholder 2">
             <a:extLst>
               <a:ext uri="{FF2B5EF4-FFF2-40B4-BE49-F238E27FC236}">
-                <a16:creationId xmlns:a16="http://schemas.microsoft.com/office/drawing/2014/main" id="{2F3AD7D0-9395-5347-AB7C-44F4DD07C190}"/>
+                <a16:creationId xmlns:a16="http://schemas.microsoft.com/office/drawing/2014/main" xmlns="" id="{2F3AD7D0-9395-5347-AB7C-44F4DD07C190}"/>
               </a:ext>
             </a:extLst>
           </p:cNvPr>
@@ -4237,30 +4237,68 @@
               <a:rPr lang="mr-IN" dirty="0">
                 <a:latin typeface="Menlo" charset="0"/>
               </a:rPr>
-              <a:t>": "</a:t>
+              <a:t>": </a:t>
+            </a:r>
+            <a:r>
+              <a:rPr lang="mr-IN" dirty="0" smtClean="0">
+                <a:latin typeface="Menlo" charset="0"/>
+              </a:rPr>
+              <a:t>"</a:t>
+            </a:r>
+            <a:r>
+              <a:rPr lang="en-US" dirty="0" smtClean="0">
+                <a:latin typeface="Menlo" charset="0"/>
+              </a:rPr>
+              <a:t>object</a:t>
+            </a:r>
+            <a:r>
+              <a:rPr lang="mr-IN" dirty="0" smtClean="0">
+                <a:latin typeface="Menlo" charset="0"/>
+              </a:rPr>
+              <a:t>"</a:t>
+            </a:r>
+            <a:endParaRPr lang="mr-IN" dirty="0">
+              <a:latin typeface="Menlo" charset="0"/>
+            </a:endParaRPr>
+          </a:p>
+          <a:p>
+            <a:r>
+              <a:rPr lang="mr-IN" dirty="0">
+                <a:latin typeface="Menlo" charset="0"/>
+              </a:rPr>
+              <a:t>},</a:t>
+            </a:r>
+          </a:p>
+          <a:p>
+            <a:r>
+              <a:rPr lang="mr-IN" dirty="0">
+                <a:latin typeface="Menlo" charset="0"/>
+              </a:rPr>
+              <a:t>"</a:t>
             </a:r>
             <a:r>
               <a:rPr lang="mr-IN" dirty="0" err="1">
-                <a:latin typeface="Menlo" charset="0"/>
-              </a:rPr>
-              <a:t>string</a:t>
-            </a:r>
-            <a:r>
-              <a:rPr lang="mr-IN" dirty="0">
-                <a:latin typeface="Menlo" charset="0"/>
-              </a:rPr>
-              <a:t>"</a:t>
-            </a:r>
-          </a:p>
-          <a:p>
-            <a:r>
-              <a:rPr lang="mr-IN" dirty="0">
-                <a:latin typeface="Menlo" charset="0"/>
-              </a:rPr>
-              <a:t>},</a:t>
-            </a:r>
-          </a:p>
-          <a:p>
+                <a:solidFill>
+                  <a:srgbClr val="FF0000"/>
+                </a:solidFill>
+                <a:latin typeface="Menlo" charset="0"/>
+              </a:rPr>
+              <a:t>includes</a:t>
+            </a:r>
+            <a:r>
+              <a:rPr lang="mr-IN" dirty="0">
+                <a:latin typeface="Menlo" charset="0"/>
+              </a:rPr>
+              <a:t>": {</a:t>
+            </a:r>
+          </a:p>
+          <a:p>
+            <a:r>
+              <a:rPr lang="en-US" dirty="0">
+                <a:latin typeface="Menlo" charset="0"/>
+              </a:rPr>
+              <a:t>  </a:t>
+            </a:r>
             <a:r>
               <a:rPr lang="mr-IN" dirty="0">
                 <a:latin typeface="Menlo" charset="0"/>
@@ -4269,35 +4307,6 @@
             </a:r>
             <a:r>
               <a:rPr lang="mr-IN" dirty="0" err="1">
-                <a:solidFill>
-                  <a:srgbClr val="FF0000"/>
-                </a:solidFill>
-                <a:latin typeface="Menlo" charset="0"/>
-              </a:rPr>
-              <a:t>includes</a:t>
-            </a:r>
-            <a:r>
-              <a:rPr lang="mr-IN" dirty="0">
-                <a:latin typeface="Menlo" charset="0"/>
-              </a:rPr>
-              <a:t>": {</a:t>
-            </a:r>
-          </a:p>
-          <a:p>
-            <a:r>
-              <a:rPr lang="en-US" dirty="0">
-                <a:latin typeface="Menlo" charset="0"/>
-              </a:rPr>
-              <a:t>  </a:t>
-            </a:r>
-            <a:r>
-              <a:rPr lang="mr-IN" dirty="0">
-                <a:latin typeface="Menlo" charset="0"/>
-              </a:rPr>
-              <a:t>"</a:t>
-            </a:r>
-            <a:r>
-              <a:rPr lang="mr-IN" dirty="0" err="1">
                 <a:latin typeface="Menlo" charset="0"/>
               </a:rPr>
               <a:t>type</a:t>
@@ -4306,20 +4315,29 @@
               <a:rPr lang="mr-IN" dirty="0">
                 <a:latin typeface="Menlo" charset="0"/>
               </a:rPr>
-              <a:t>": "</a:t>
-            </a:r>
-            <a:r>
-              <a:rPr lang="mr-IN" dirty="0" err="1">
-                <a:latin typeface="Menlo" charset="0"/>
-              </a:rPr>
-              <a:t>string</a:t>
-            </a:r>
-            <a:r>
-              <a:rPr lang="mr-IN" dirty="0">
-                <a:latin typeface="Menlo" charset="0"/>
-              </a:rPr>
-              <a:t>"</a:t>
-            </a:r>
+              <a:t>": </a:t>
+            </a:r>
+            <a:r>
+              <a:rPr lang="mr-IN" dirty="0" smtClean="0">
+                <a:latin typeface="Menlo" charset="0"/>
+              </a:rPr>
+              <a:t>"</a:t>
+            </a:r>
+            <a:r>
+              <a:rPr lang="en-US" dirty="0" smtClean="0">
+                <a:latin typeface="Menlo" charset="0"/>
+              </a:rPr>
+              <a:t>array</a:t>
+            </a:r>
+            <a:r>
+              <a:rPr lang="mr-IN" dirty="0" smtClean="0">
+                <a:latin typeface="Menlo" charset="0"/>
+              </a:rPr>
+              <a:t>"</a:t>
+            </a:r>
+            <a:endParaRPr lang="mr-IN" dirty="0">
+              <a:latin typeface="Menlo" charset="0"/>
+            </a:endParaRPr>
           </a:p>
           <a:p>
             <a:r>
@@ -4366,7 +4384,7 @@
           <p:cNvPr id="2" name="Title 1">
             <a:extLst>
               <a:ext uri="{FF2B5EF4-FFF2-40B4-BE49-F238E27FC236}">
-                <a16:creationId xmlns:a16="http://schemas.microsoft.com/office/drawing/2014/main" id="{B0B6741D-388C-874F-9304-6B070A101447}"/>
+                <a16:creationId xmlns:a16="http://schemas.microsoft.com/office/drawing/2014/main" xmlns="" id="{B0B6741D-388C-874F-9304-6B070A101447}"/>
               </a:ext>
             </a:extLst>
           </p:cNvPr>
@@ -4391,26 +4409,666 @@
       </p:sp>
       <p:sp>
         <p:nvSpPr>
-          <p:cNvPr id="3" name="Content Placeholder 2">
-            <a:extLst>
-              <a:ext uri="{FF2B5EF4-FFF2-40B4-BE49-F238E27FC236}">
-                <a16:creationId xmlns:a16="http://schemas.microsoft.com/office/drawing/2014/main" id="{C820C189-55E0-2E4C-8D18-8B936F562B7B}"/>
-              </a:ext>
-            </a:extLst>
-          </p:cNvPr>
-          <p:cNvSpPr>
-            <a:spLocks noGrp="1"/>
-          </p:cNvSpPr>
-          <p:nvPr>
-            <p:ph idx="1"/>
-          </p:nvPr>
+          <p:cNvPr id="6" name="Rectangle 5"/>
+          <p:cNvSpPr/>
+          <p:nvPr/>
         </p:nvSpPr>
-        <p:spPr/>
+        <p:spPr>
+          <a:xfrm>
+            <a:off x="1098467" y="1911260"/>
+            <a:ext cx="3164775" cy="4247317"/>
+          </a:xfrm>
+          <a:prstGeom prst="rect">
+            <a:avLst/>
+          </a:prstGeom>
+        </p:spPr>
         <p:txBody>
-          <a:bodyPr/>
+          <a:bodyPr wrap="square">
+            <a:spAutoFit/>
+          </a:bodyPr>
           <a:lstStyle/>
           <a:p>
-            <a:endParaRPr lang="en-US"/>
+            <a:r>
+              <a:rPr lang="mr-IN" dirty="0">
+                <a:latin typeface="Menlo" charset="0"/>
+              </a:rPr>
+              <a:t>"</a:t>
+            </a:r>
+            <a:r>
+              <a:rPr lang="en-US" dirty="0">
+                <a:solidFill>
+                  <a:srgbClr val="FF0000"/>
+                </a:solidFill>
+                <a:latin typeface="Menlo" charset="0"/>
+              </a:rPr>
+              <a:t>description</a:t>
+            </a:r>
+            <a:r>
+              <a:rPr lang="mr-IN" dirty="0">
+                <a:latin typeface="Menlo" charset="0"/>
+              </a:rPr>
+              <a:t>": {</a:t>
+            </a:r>
+          </a:p>
+          <a:p>
+            <a:r>
+              <a:rPr lang="en-US" dirty="0">
+                <a:latin typeface="Menlo" charset="0"/>
+              </a:rPr>
+              <a:t>  </a:t>
+            </a:r>
+            <a:r>
+              <a:rPr lang="mr-IN" dirty="0">
+                <a:latin typeface="Menlo" charset="0"/>
+              </a:rPr>
+              <a:t>"</a:t>
+            </a:r>
+            <a:r>
+              <a:rPr lang="mr-IN" dirty="0" err="1">
+                <a:latin typeface="Menlo" charset="0"/>
+              </a:rPr>
+              <a:t>type</a:t>
+            </a:r>
+            <a:r>
+              <a:rPr lang="mr-IN" dirty="0">
+                <a:latin typeface="Menlo" charset="0"/>
+              </a:rPr>
+              <a:t>": "</a:t>
+            </a:r>
+            <a:r>
+              <a:rPr lang="mr-IN" dirty="0" err="1">
+                <a:latin typeface="Menlo" charset="0"/>
+              </a:rPr>
+              <a:t>string</a:t>
+            </a:r>
+            <a:r>
+              <a:rPr lang="mr-IN" dirty="0">
+                <a:latin typeface="Menlo" charset="0"/>
+              </a:rPr>
+              <a:t>"</a:t>
+            </a:r>
+          </a:p>
+          <a:p>
+            <a:r>
+              <a:rPr lang="mr-IN" dirty="0">
+                <a:latin typeface="Menlo" charset="0"/>
+              </a:rPr>
+              <a:t>},</a:t>
+            </a:r>
+          </a:p>
+          <a:p>
+            <a:r>
+              <a:rPr lang="mr-IN" dirty="0">
+                <a:latin typeface="Menlo" charset="0"/>
+              </a:rPr>
+              <a:t>"</a:t>
+            </a:r>
+            <a:r>
+              <a:rPr lang="mr-IN" dirty="0" err="1">
+                <a:solidFill>
+                  <a:srgbClr val="FF0000"/>
+                </a:solidFill>
+                <a:latin typeface="Menlo" charset="0"/>
+              </a:rPr>
+              <a:t>title</a:t>
+            </a:r>
+            <a:r>
+              <a:rPr lang="mr-IN" dirty="0">
+                <a:latin typeface="Menlo" charset="0"/>
+              </a:rPr>
+              <a:t>": {</a:t>
+            </a:r>
+          </a:p>
+          <a:p>
+            <a:r>
+              <a:rPr lang="en-US" dirty="0">
+                <a:latin typeface="Menlo" charset="0"/>
+              </a:rPr>
+              <a:t>  </a:t>
+            </a:r>
+            <a:r>
+              <a:rPr lang="mr-IN" dirty="0">
+                <a:latin typeface="Menlo" charset="0"/>
+              </a:rPr>
+              <a:t>"</a:t>
+            </a:r>
+            <a:r>
+              <a:rPr lang="mr-IN" dirty="0" err="1">
+                <a:latin typeface="Menlo" charset="0"/>
+              </a:rPr>
+              <a:t>type</a:t>
+            </a:r>
+            <a:r>
+              <a:rPr lang="mr-IN" dirty="0">
+                <a:latin typeface="Menlo" charset="0"/>
+              </a:rPr>
+              <a:t>": "</a:t>
+            </a:r>
+            <a:r>
+              <a:rPr lang="mr-IN" dirty="0" err="1">
+                <a:latin typeface="Menlo" charset="0"/>
+              </a:rPr>
+              <a:t>string</a:t>
+            </a:r>
+            <a:r>
+              <a:rPr lang="mr-IN" dirty="0">
+                <a:latin typeface="Menlo" charset="0"/>
+              </a:rPr>
+              <a:t>"</a:t>
+            </a:r>
+          </a:p>
+          <a:p>
+            <a:r>
+              <a:rPr lang="mr-IN" dirty="0">
+                <a:latin typeface="Menlo" charset="0"/>
+              </a:rPr>
+              <a:t>},</a:t>
+            </a:r>
+          </a:p>
+          <a:p>
+            <a:r>
+              <a:rPr lang="mr-IN" dirty="0">
+                <a:latin typeface="Menlo" charset="0"/>
+              </a:rPr>
+              <a:t>"</a:t>
+            </a:r>
+            <a:r>
+              <a:rPr lang="mr-IN" dirty="0" err="1">
+                <a:solidFill>
+                  <a:srgbClr val="FF0000"/>
+                </a:solidFill>
+                <a:latin typeface="Menlo" charset="0"/>
+              </a:rPr>
+              <a:t>id</a:t>
+            </a:r>
+            <a:r>
+              <a:rPr lang="mr-IN" dirty="0">
+                <a:latin typeface="Menlo" charset="0"/>
+              </a:rPr>
+              <a:t>": {</a:t>
+            </a:r>
+          </a:p>
+          <a:p>
+            <a:r>
+              <a:rPr lang="en-US" dirty="0">
+                <a:latin typeface="Menlo" charset="0"/>
+              </a:rPr>
+              <a:t>  </a:t>
+            </a:r>
+            <a:r>
+              <a:rPr lang="mr-IN" dirty="0">
+                <a:latin typeface="Menlo" charset="0"/>
+              </a:rPr>
+              <a:t>"</a:t>
+            </a:r>
+            <a:r>
+              <a:rPr lang="mr-IN" dirty="0" err="1">
+                <a:latin typeface="Menlo" charset="0"/>
+              </a:rPr>
+              <a:t>type</a:t>
+            </a:r>
+            <a:r>
+              <a:rPr lang="mr-IN" dirty="0">
+                <a:latin typeface="Menlo" charset="0"/>
+              </a:rPr>
+              <a:t>": "</a:t>
+            </a:r>
+            <a:r>
+              <a:rPr lang="mr-IN" dirty="0" err="1">
+                <a:latin typeface="Menlo" charset="0"/>
+              </a:rPr>
+              <a:t>string</a:t>
+            </a:r>
+            <a:r>
+              <a:rPr lang="mr-IN" dirty="0">
+                <a:latin typeface="Menlo" charset="0"/>
+              </a:rPr>
+              <a:t>"</a:t>
+            </a:r>
+          </a:p>
+          <a:p>
+            <a:r>
+              <a:rPr lang="mr-IN" dirty="0">
+                <a:latin typeface="Menlo" charset="0"/>
+              </a:rPr>
+              <a:t>},</a:t>
+            </a:r>
+          </a:p>
+          <a:p>
+            <a:r>
+              <a:rPr lang="mr-IN" dirty="0">
+                <a:latin typeface="Menlo" charset="0"/>
+              </a:rPr>
+              <a:t>"</a:t>
+            </a:r>
+            <a:r>
+              <a:rPr lang="mr-IN" dirty="0" err="1">
+                <a:solidFill>
+                  <a:srgbClr val="FF0000"/>
+                </a:solidFill>
+                <a:latin typeface="Menlo" charset="0"/>
+              </a:rPr>
+              <a:t>name</a:t>
+            </a:r>
+            <a:r>
+              <a:rPr lang="mr-IN" dirty="0">
+                <a:latin typeface="Menlo" charset="0"/>
+              </a:rPr>
+              <a:t>": {</a:t>
+            </a:r>
+          </a:p>
+          <a:p>
+            <a:r>
+              <a:rPr lang="en-US" dirty="0">
+                <a:latin typeface="Menlo" charset="0"/>
+              </a:rPr>
+              <a:t>  </a:t>
+            </a:r>
+            <a:r>
+              <a:rPr lang="mr-IN" dirty="0">
+                <a:latin typeface="Menlo" charset="0"/>
+              </a:rPr>
+              <a:t>"</a:t>
+            </a:r>
+            <a:r>
+              <a:rPr lang="mr-IN" dirty="0" err="1">
+                <a:latin typeface="Menlo" charset="0"/>
+              </a:rPr>
+              <a:t>type</a:t>
+            </a:r>
+            <a:r>
+              <a:rPr lang="mr-IN" dirty="0">
+                <a:latin typeface="Menlo" charset="0"/>
+              </a:rPr>
+              <a:t>": "</a:t>
+            </a:r>
+            <a:r>
+              <a:rPr lang="mr-IN" dirty="0" err="1">
+                <a:latin typeface="Menlo" charset="0"/>
+              </a:rPr>
+              <a:t>string</a:t>
+            </a:r>
+            <a:r>
+              <a:rPr lang="mr-IN" dirty="0">
+                <a:latin typeface="Menlo" charset="0"/>
+              </a:rPr>
+              <a:t>"</a:t>
+            </a:r>
+          </a:p>
+          <a:p>
+            <a:r>
+              <a:rPr lang="mr-IN" dirty="0">
+                <a:latin typeface="Menlo" charset="0"/>
+              </a:rPr>
+              <a:t>},</a:t>
+            </a:r>
+          </a:p>
+          <a:p>
+            <a:r>
+              <a:rPr lang="mr-IN" dirty="0">
+                <a:latin typeface="Menlo" charset="0"/>
+              </a:rPr>
+              <a:t>"</a:t>
+            </a:r>
+            <a:r>
+              <a:rPr lang="mr-IN" dirty="0" err="1">
+                <a:solidFill>
+                  <a:srgbClr val="FF0000"/>
+                </a:solidFill>
+                <a:latin typeface="Menlo" charset="0"/>
+              </a:rPr>
+              <a:t>type</a:t>
+            </a:r>
+            <a:r>
+              <a:rPr lang="mr-IN" dirty="0">
+                <a:latin typeface="Menlo" charset="0"/>
+              </a:rPr>
+              <a:t>": {</a:t>
+            </a:r>
+          </a:p>
+          <a:p>
+            <a:r>
+              <a:rPr lang="en-US" dirty="0">
+                <a:latin typeface="Menlo" charset="0"/>
+              </a:rPr>
+              <a:t>  </a:t>
+            </a:r>
+            <a:r>
+              <a:rPr lang="mr-IN" dirty="0">
+                <a:latin typeface="Menlo" charset="0"/>
+              </a:rPr>
+              <a:t>"</a:t>
+            </a:r>
+            <a:r>
+              <a:rPr lang="mr-IN" dirty="0" err="1">
+                <a:latin typeface="Menlo" charset="0"/>
+              </a:rPr>
+              <a:t>type</a:t>
+            </a:r>
+            <a:r>
+              <a:rPr lang="mr-IN" dirty="0">
+                <a:latin typeface="Menlo" charset="0"/>
+              </a:rPr>
+              <a:t>": "</a:t>
+            </a:r>
+            <a:r>
+              <a:rPr lang="mr-IN" dirty="0" err="1">
+                <a:latin typeface="Menlo" charset="0"/>
+              </a:rPr>
+              <a:t>string</a:t>
+            </a:r>
+            <a:r>
+              <a:rPr lang="mr-IN" dirty="0">
+                <a:latin typeface="Menlo" charset="0"/>
+              </a:rPr>
+              <a:t>"</a:t>
+            </a:r>
+          </a:p>
+          <a:p>
+            <a:r>
+              <a:rPr lang="mr-IN" dirty="0">
+                <a:latin typeface="Menlo" charset="0"/>
+              </a:rPr>
+              <a:t>},</a:t>
+            </a:r>
+          </a:p>
+        </p:txBody>
+      </p:sp>
+      <p:sp>
+        <p:nvSpPr>
+          <p:cNvPr id="7" name="Rectangle 6"/>
+          <p:cNvSpPr/>
+          <p:nvPr/>
+        </p:nvSpPr>
+        <p:spPr>
+          <a:xfrm>
+            <a:off x="4500748" y="1911260"/>
+            <a:ext cx="3111335" cy="3416320"/>
+          </a:xfrm>
+          <a:prstGeom prst="rect">
+            <a:avLst/>
+          </a:prstGeom>
+        </p:spPr>
+        <p:txBody>
+          <a:bodyPr wrap="square">
+            <a:spAutoFit/>
+          </a:bodyPr>
+          <a:lstStyle/>
+          <a:p>
+            <a:r>
+              <a:rPr lang="en-US" dirty="0">
+                <a:latin typeface="Menlo" charset="0"/>
+              </a:rPr>
+              <a:t>"</a:t>
+            </a:r>
+            <a:r>
+              <a:rPr lang="en-US" dirty="0">
+                <a:solidFill>
+                  <a:srgbClr val="FF0000"/>
+                </a:solidFill>
+                <a:latin typeface="Menlo" charset="0"/>
+              </a:rPr>
+              <a:t>optional</a:t>
+            </a:r>
+            <a:r>
+              <a:rPr lang="en-US" dirty="0">
+                <a:latin typeface="Menlo" charset="0"/>
+              </a:rPr>
+              <a:t>": {</a:t>
+            </a:r>
+          </a:p>
+          <a:p>
+            <a:r>
+              <a:rPr lang="en-US" dirty="0">
+                <a:latin typeface="Menlo" charset="0"/>
+              </a:rPr>
+              <a:t>  "type": </a:t>
+            </a:r>
+            <a:r>
+              <a:rPr lang="en-US" dirty="0" err="1">
+                <a:latin typeface="Menlo" charset="0"/>
+              </a:rPr>
+              <a:t>boolean</a:t>
+            </a:r>
+            <a:r>
+              <a:rPr lang="en-US" dirty="0">
+                <a:latin typeface="Menlo" charset="0"/>
+              </a:rPr>
+              <a:t>"</a:t>
+            </a:r>
+          </a:p>
+          <a:p>
+            <a:r>
+              <a:rPr lang="en-US" dirty="0">
+                <a:latin typeface="Menlo" charset="0"/>
+              </a:rPr>
+              <a:t>{</a:t>
+            </a:r>
+          </a:p>
+          <a:p>
+            <a:r>
+              <a:rPr lang="mr-IN" dirty="0">
+                <a:latin typeface="Menlo" charset="0"/>
+              </a:rPr>
+              <a:t>"</a:t>
+            </a:r>
+            <a:r>
+              <a:rPr lang="mr-IN" dirty="0" err="1">
+                <a:solidFill>
+                  <a:srgbClr val="FF0000"/>
+                </a:solidFill>
+                <a:latin typeface="Menlo" charset="0"/>
+              </a:rPr>
+              <a:t>extends</a:t>
+            </a:r>
+            <a:r>
+              <a:rPr lang="mr-IN" dirty="0">
+                <a:latin typeface="Menlo" charset="0"/>
+              </a:rPr>
+              <a:t>": {</a:t>
+            </a:r>
+          </a:p>
+          <a:p>
+            <a:r>
+              <a:rPr lang="en-US" dirty="0">
+                <a:latin typeface="Menlo" charset="0"/>
+              </a:rPr>
+              <a:t>  </a:t>
+            </a:r>
+            <a:r>
+              <a:rPr lang="mr-IN" dirty="0">
+                <a:latin typeface="Menlo" charset="0"/>
+              </a:rPr>
+              <a:t>"</a:t>
+            </a:r>
+            <a:r>
+              <a:rPr lang="mr-IN" dirty="0" err="1">
+                <a:latin typeface="Menlo" charset="0"/>
+              </a:rPr>
+              <a:t>type</a:t>
+            </a:r>
+            <a:r>
+              <a:rPr lang="mr-IN" dirty="0">
+                <a:latin typeface="Menlo" charset="0"/>
+              </a:rPr>
+              <a:t>": "</a:t>
+            </a:r>
+            <a:r>
+              <a:rPr lang="mr-IN" dirty="0" err="1">
+                <a:latin typeface="Menlo" charset="0"/>
+              </a:rPr>
+              <a:t>string</a:t>
+            </a:r>
+            <a:r>
+              <a:rPr lang="mr-IN" dirty="0">
+                <a:latin typeface="Menlo" charset="0"/>
+              </a:rPr>
+              <a:t>"</a:t>
+            </a:r>
+          </a:p>
+          <a:p>
+            <a:r>
+              <a:rPr lang="mr-IN" dirty="0">
+                <a:latin typeface="Menlo" charset="0"/>
+              </a:rPr>
+              <a:t>},</a:t>
+            </a:r>
+          </a:p>
+          <a:p>
+            <a:r>
+              <a:rPr lang="mr-IN" dirty="0">
+                <a:latin typeface="Menlo" charset="0"/>
+              </a:rPr>
+              <a:t>"</a:t>
+            </a:r>
+            <a:r>
+              <a:rPr lang="mr-IN" dirty="0" err="1">
+                <a:solidFill>
+                  <a:srgbClr val="FF0000"/>
+                </a:solidFill>
+                <a:latin typeface="Menlo" charset="0"/>
+              </a:rPr>
+              <a:t>refines</a:t>
+            </a:r>
+            <a:r>
+              <a:rPr lang="mr-IN" dirty="0">
+                <a:latin typeface="Menlo" charset="0"/>
+              </a:rPr>
+              <a:t>": {</a:t>
+            </a:r>
+          </a:p>
+          <a:p>
+            <a:r>
+              <a:rPr lang="en-US" dirty="0">
+                <a:latin typeface="Menlo" charset="0"/>
+              </a:rPr>
+              <a:t>  </a:t>
+            </a:r>
+            <a:r>
+              <a:rPr lang="mr-IN" dirty="0">
+                <a:latin typeface="Menlo" charset="0"/>
+              </a:rPr>
+              <a:t>"</a:t>
+            </a:r>
+            <a:r>
+              <a:rPr lang="mr-IN" dirty="0" err="1">
+                <a:latin typeface="Menlo" charset="0"/>
+              </a:rPr>
+              <a:t>type</a:t>
+            </a:r>
+            <a:r>
+              <a:rPr lang="mr-IN" dirty="0">
+                <a:latin typeface="Menlo" charset="0"/>
+              </a:rPr>
+              <a:t>": </a:t>
+            </a:r>
+            <a:r>
+              <a:rPr lang="mr-IN" dirty="0" smtClean="0">
+                <a:latin typeface="Menlo" charset="0"/>
+              </a:rPr>
+              <a:t>"</a:t>
+            </a:r>
+            <a:r>
+              <a:rPr lang="en-US" dirty="0" smtClean="0">
+                <a:latin typeface="Menlo" charset="0"/>
+              </a:rPr>
+              <a:t>object</a:t>
+            </a:r>
+            <a:r>
+              <a:rPr lang="mr-IN" dirty="0" smtClean="0">
+                <a:latin typeface="Menlo" charset="0"/>
+              </a:rPr>
+              <a:t>"</a:t>
+            </a:r>
+            <a:endParaRPr lang="mr-IN" dirty="0">
+              <a:latin typeface="Menlo" charset="0"/>
+            </a:endParaRPr>
+          </a:p>
+          <a:p>
+            <a:r>
+              <a:rPr lang="mr-IN" dirty="0">
+                <a:latin typeface="Menlo" charset="0"/>
+              </a:rPr>
+              <a:t>},</a:t>
+            </a:r>
+          </a:p>
+          <a:p>
+            <a:r>
+              <a:rPr lang="mr-IN" dirty="0">
+                <a:latin typeface="Menlo" charset="0"/>
+              </a:rPr>
+              <a:t>"</a:t>
+            </a:r>
+            <a:r>
+              <a:rPr lang="mr-IN" dirty="0" err="1">
+                <a:solidFill>
+                  <a:srgbClr val="FF0000"/>
+                </a:solidFill>
+                <a:latin typeface="Menlo" charset="0"/>
+              </a:rPr>
+              <a:t>includes</a:t>
+            </a:r>
+            <a:r>
+              <a:rPr lang="mr-IN" dirty="0">
+                <a:latin typeface="Menlo" charset="0"/>
+              </a:rPr>
+              <a:t>": {</a:t>
+            </a:r>
+          </a:p>
+          <a:p>
+            <a:r>
+              <a:rPr lang="en-US" dirty="0">
+                <a:latin typeface="Menlo" charset="0"/>
+              </a:rPr>
+              <a:t>  </a:t>
+            </a:r>
+            <a:r>
+              <a:rPr lang="mr-IN" dirty="0">
+                <a:latin typeface="Menlo" charset="0"/>
+              </a:rPr>
+              <a:t>"</a:t>
+            </a:r>
+            <a:r>
+              <a:rPr lang="mr-IN" dirty="0" err="1">
+                <a:latin typeface="Menlo" charset="0"/>
+              </a:rPr>
+              <a:t>type</a:t>
+            </a:r>
+            <a:r>
+              <a:rPr lang="mr-IN" dirty="0">
+                <a:latin typeface="Menlo" charset="0"/>
+              </a:rPr>
+              <a:t>": </a:t>
+            </a:r>
+            <a:r>
+              <a:rPr lang="mr-IN" dirty="0" smtClean="0">
+                <a:latin typeface="Menlo" charset="0"/>
+              </a:rPr>
+              <a:t>"</a:t>
+            </a:r>
+            <a:r>
+              <a:rPr lang="en-US" dirty="0" smtClean="0">
+                <a:latin typeface="Menlo" charset="0"/>
+              </a:rPr>
+              <a:t>array</a:t>
+            </a:r>
+            <a:r>
+              <a:rPr lang="mr-IN" dirty="0" smtClean="0">
+                <a:latin typeface="Menlo" charset="0"/>
+              </a:rPr>
+              <a:t>"</a:t>
+            </a:r>
+            <a:endParaRPr lang="mr-IN" dirty="0">
+              <a:latin typeface="Menlo" charset="0"/>
+            </a:endParaRPr>
+          </a:p>
+          <a:p>
+            <a:r>
+              <a:rPr lang="mr-IN" dirty="0">
+                <a:latin typeface="Menlo" charset="0"/>
+              </a:rPr>
+              <a:t>},</a:t>
+            </a:r>
           </a:p>
         </p:txBody>
       </p:sp>
@@ -4449,7 +5107,7 @@
           <p:cNvPr id="2" name="Title 1">
             <a:extLst>
               <a:ext uri="{FF2B5EF4-FFF2-40B4-BE49-F238E27FC236}">
-                <a16:creationId xmlns:a16="http://schemas.microsoft.com/office/drawing/2014/main" id="{EF6C8738-CAFC-C74A-9084-0B0F6C899E27}"/>
+                <a16:creationId xmlns:a16="http://schemas.microsoft.com/office/drawing/2014/main" xmlns="" id="{EF6C8738-CAFC-C74A-9084-0B0F6C899E27}"/>
               </a:ext>
             </a:extLst>
           </p:cNvPr>
@@ -4474,26 +5132,666 @@
       </p:sp>
       <p:sp>
         <p:nvSpPr>
-          <p:cNvPr id="3" name="Content Placeholder 2">
-            <a:extLst>
-              <a:ext uri="{FF2B5EF4-FFF2-40B4-BE49-F238E27FC236}">
-                <a16:creationId xmlns:a16="http://schemas.microsoft.com/office/drawing/2014/main" id="{0FA797F1-1D15-BF48-B3FF-27F4C1C62830}"/>
-              </a:ext>
-            </a:extLst>
-          </p:cNvPr>
-          <p:cNvSpPr>
-            <a:spLocks noGrp="1"/>
-          </p:cNvSpPr>
-          <p:nvPr>
-            <p:ph idx="1"/>
-          </p:nvPr>
+          <p:cNvPr id="4" name="Rectangle 3"/>
+          <p:cNvSpPr/>
+          <p:nvPr/>
         </p:nvSpPr>
-        <p:spPr/>
+        <p:spPr>
+          <a:xfrm>
+            <a:off x="1098467" y="1911260"/>
+            <a:ext cx="3164775" cy="4247317"/>
+          </a:xfrm>
+          <a:prstGeom prst="rect">
+            <a:avLst/>
+          </a:prstGeom>
+        </p:spPr>
         <p:txBody>
-          <a:bodyPr/>
+          <a:bodyPr wrap="square">
+            <a:spAutoFit/>
+          </a:bodyPr>
           <a:lstStyle/>
           <a:p>
-            <a:endParaRPr lang="en-US"/>
+            <a:r>
+              <a:rPr lang="mr-IN" dirty="0">
+                <a:latin typeface="Menlo" charset="0"/>
+              </a:rPr>
+              <a:t>"</a:t>
+            </a:r>
+            <a:r>
+              <a:rPr lang="en-US" dirty="0">
+                <a:solidFill>
+                  <a:srgbClr val="FF0000"/>
+                </a:solidFill>
+                <a:latin typeface="Menlo" charset="0"/>
+              </a:rPr>
+              <a:t>description</a:t>
+            </a:r>
+            <a:r>
+              <a:rPr lang="mr-IN" dirty="0">
+                <a:latin typeface="Menlo" charset="0"/>
+              </a:rPr>
+              <a:t>": {</a:t>
+            </a:r>
+          </a:p>
+          <a:p>
+            <a:r>
+              <a:rPr lang="en-US" dirty="0">
+                <a:latin typeface="Menlo" charset="0"/>
+              </a:rPr>
+              <a:t>  </a:t>
+            </a:r>
+            <a:r>
+              <a:rPr lang="mr-IN" dirty="0">
+                <a:latin typeface="Menlo" charset="0"/>
+              </a:rPr>
+              <a:t>"</a:t>
+            </a:r>
+            <a:r>
+              <a:rPr lang="mr-IN" dirty="0" err="1">
+                <a:latin typeface="Menlo" charset="0"/>
+              </a:rPr>
+              <a:t>type</a:t>
+            </a:r>
+            <a:r>
+              <a:rPr lang="mr-IN" dirty="0">
+                <a:latin typeface="Menlo" charset="0"/>
+              </a:rPr>
+              <a:t>": "</a:t>
+            </a:r>
+            <a:r>
+              <a:rPr lang="mr-IN" dirty="0" err="1">
+                <a:latin typeface="Menlo" charset="0"/>
+              </a:rPr>
+              <a:t>string</a:t>
+            </a:r>
+            <a:r>
+              <a:rPr lang="mr-IN" dirty="0">
+                <a:latin typeface="Menlo" charset="0"/>
+              </a:rPr>
+              <a:t>"</a:t>
+            </a:r>
+          </a:p>
+          <a:p>
+            <a:r>
+              <a:rPr lang="mr-IN" dirty="0">
+                <a:latin typeface="Menlo" charset="0"/>
+              </a:rPr>
+              <a:t>},</a:t>
+            </a:r>
+          </a:p>
+          <a:p>
+            <a:r>
+              <a:rPr lang="mr-IN" dirty="0">
+                <a:latin typeface="Menlo" charset="0"/>
+              </a:rPr>
+              <a:t>"</a:t>
+            </a:r>
+            <a:r>
+              <a:rPr lang="mr-IN" dirty="0" err="1">
+                <a:solidFill>
+                  <a:srgbClr val="FF0000"/>
+                </a:solidFill>
+                <a:latin typeface="Menlo" charset="0"/>
+              </a:rPr>
+              <a:t>title</a:t>
+            </a:r>
+            <a:r>
+              <a:rPr lang="mr-IN" dirty="0">
+                <a:latin typeface="Menlo" charset="0"/>
+              </a:rPr>
+              <a:t>": {</a:t>
+            </a:r>
+          </a:p>
+          <a:p>
+            <a:r>
+              <a:rPr lang="en-US" dirty="0">
+                <a:latin typeface="Menlo" charset="0"/>
+              </a:rPr>
+              <a:t>  </a:t>
+            </a:r>
+            <a:r>
+              <a:rPr lang="mr-IN" dirty="0">
+                <a:latin typeface="Menlo" charset="0"/>
+              </a:rPr>
+              <a:t>"</a:t>
+            </a:r>
+            <a:r>
+              <a:rPr lang="mr-IN" dirty="0" err="1">
+                <a:latin typeface="Menlo" charset="0"/>
+              </a:rPr>
+              <a:t>type</a:t>
+            </a:r>
+            <a:r>
+              <a:rPr lang="mr-IN" dirty="0">
+                <a:latin typeface="Menlo" charset="0"/>
+              </a:rPr>
+              <a:t>": "</a:t>
+            </a:r>
+            <a:r>
+              <a:rPr lang="mr-IN" dirty="0" err="1">
+                <a:latin typeface="Menlo" charset="0"/>
+              </a:rPr>
+              <a:t>string</a:t>
+            </a:r>
+            <a:r>
+              <a:rPr lang="mr-IN" dirty="0">
+                <a:latin typeface="Menlo" charset="0"/>
+              </a:rPr>
+              <a:t>"</a:t>
+            </a:r>
+          </a:p>
+          <a:p>
+            <a:r>
+              <a:rPr lang="mr-IN" dirty="0">
+                <a:latin typeface="Menlo" charset="0"/>
+              </a:rPr>
+              <a:t>},</a:t>
+            </a:r>
+          </a:p>
+          <a:p>
+            <a:r>
+              <a:rPr lang="mr-IN" dirty="0">
+                <a:latin typeface="Menlo" charset="0"/>
+              </a:rPr>
+              <a:t>"</a:t>
+            </a:r>
+            <a:r>
+              <a:rPr lang="mr-IN" dirty="0" err="1">
+                <a:solidFill>
+                  <a:srgbClr val="FF0000"/>
+                </a:solidFill>
+                <a:latin typeface="Menlo" charset="0"/>
+              </a:rPr>
+              <a:t>id</a:t>
+            </a:r>
+            <a:r>
+              <a:rPr lang="mr-IN" dirty="0">
+                <a:latin typeface="Menlo" charset="0"/>
+              </a:rPr>
+              <a:t>": {</a:t>
+            </a:r>
+          </a:p>
+          <a:p>
+            <a:r>
+              <a:rPr lang="en-US" dirty="0">
+                <a:latin typeface="Menlo" charset="0"/>
+              </a:rPr>
+              <a:t>  </a:t>
+            </a:r>
+            <a:r>
+              <a:rPr lang="mr-IN" dirty="0">
+                <a:latin typeface="Menlo" charset="0"/>
+              </a:rPr>
+              <a:t>"</a:t>
+            </a:r>
+            <a:r>
+              <a:rPr lang="mr-IN" dirty="0" err="1">
+                <a:latin typeface="Menlo" charset="0"/>
+              </a:rPr>
+              <a:t>type</a:t>
+            </a:r>
+            <a:r>
+              <a:rPr lang="mr-IN" dirty="0">
+                <a:latin typeface="Menlo" charset="0"/>
+              </a:rPr>
+              <a:t>": "</a:t>
+            </a:r>
+            <a:r>
+              <a:rPr lang="mr-IN" dirty="0" err="1">
+                <a:latin typeface="Menlo" charset="0"/>
+              </a:rPr>
+              <a:t>string</a:t>
+            </a:r>
+            <a:r>
+              <a:rPr lang="mr-IN" dirty="0">
+                <a:latin typeface="Menlo" charset="0"/>
+              </a:rPr>
+              <a:t>"</a:t>
+            </a:r>
+          </a:p>
+          <a:p>
+            <a:r>
+              <a:rPr lang="mr-IN" dirty="0">
+                <a:latin typeface="Menlo" charset="0"/>
+              </a:rPr>
+              <a:t>},</a:t>
+            </a:r>
+          </a:p>
+          <a:p>
+            <a:r>
+              <a:rPr lang="mr-IN" dirty="0">
+                <a:latin typeface="Menlo" charset="0"/>
+              </a:rPr>
+              <a:t>"</a:t>
+            </a:r>
+            <a:r>
+              <a:rPr lang="mr-IN" dirty="0" err="1">
+                <a:solidFill>
+                  <a:srgbClr val="FF0000"/>
+                </a:solidFill>
+                <a:latin typeface="Menlo" charset="0"/>
+              </a:rPr>
+              <a:t>name</a:t>
+            </a:r>
+            <a:r>
+              <a:rPr lang="mr-IN" dirty="0">
+                <a:latin typeface="Menlo" charset="0"/>
+              </a:rPr>
+              <a:t>": {</a:t>
+            </a:r>
+          </a:p>
+          <a:p>
+            <a:r>
+              <a:rPr lang="en-US" dirty="0">
+                <a:latin typeface="Menlo" charset="0"/>
+              </a:rPr>
+              <a:t>  </a:t>
+            </a:r>
+            <a:r>
+              <a:rPr lang="mr-IN" dirty="0">
+                <a:latin typeface="Menlo" charset="0"/>
+              </a:rPr>
+              <a:t>"</a:t>
+            </a:r>
+            <a:r>
+              <a:rPr lang="mr-IN" dirty="0" err="1">
+                <a:latin typeface="Menlo" charset="0"/>
+              </a:rPr>
+              <a:t>type</a:t>
+            </a:r>
+            <a:r>
+              <a:rPr lang="mr-IN" dirty="0">
+                <a:latin typeface="Menlo" charset="0"/>
+              </a:rPr>
+              <a:t>": "</a:t>
+            </a:r>
+            <a:r>
+              <a:rPr lang="mr-IN" dirty="0" err="1">
+                <a:latin typeface="Menlo" charset="0"/>
+              </a:rPr>
+              <a:t>string</a:t>
+            </a:r>
+            <a:r>
+              <a:rPr lang="mr-IN" dirty="0">
+                <a:latin typeface="Menlo" charset="0"/>
+              </a:rPr>
+              <a:t>"</a:t>
+            </a:r>
+          </a:p>
+          <a:p>
+            <a:r>
+              <a:rPr lang="mr-IN" dirty="0">
+                <a:latin typeface="Menlo" charset="0"/>
+              </a:rPr>
+              <a:t>},</a:t>
+            </a:r>
+          </a:p>
+          <a:p>
+            <a:r>
+              <a:rPr lang="mr-IN" dirty="0">
+                <a:latin typeface="Menlo" charset="0"/>
+              </a:rPr>
+              <a:t>"</a:t>
+            </a:r>
+            <a:r>
+              <a:rPr lang="mr-IN" dirty="0" err="1">
+                <a:solidFill>
+                  <a:srgbClr val="FF0000"/>
+                </a:solidFill>
+                <a:latin typeface="Menlo" charset="0"/>
+              </a:rPr>
+              <a:t>type</a:t>
+            </a:r>
+            <a:r>
+              <a:rPr lang="mr-IN" dirty="0">
+                <a:latin typeface="Menlo" charset="0"/>
+              </a:rPr>
+              <a:t>": {</a:t>
+            </a:r>
+          </a:p>
+          <a:p>
+            <a:r>
+              <a:rPr lang="en-US" dirty="0">
+                <a:latin typeface="Menlo" charset="0"/>
+              </a:rPr>
+              <a:t>  </a:t>
+            </a:r>
+            <a:r>
+              <a:rPr lang="mr-IN" dirty="0">
+                <a:latin typeface="Menlo" charset="0"/>
+              </a:rPr>
+              <a:t>"</a:t>
+            </a:r>
+            <a:r>
+              <a:rPr lang="mr-IN" dirty="0" err="1">
+                <a:latin typeface="Menlo" charset="0"/>
+              </a:rPr>
+              <a:t>type</a:t>
+            </a:r>
+            <a:r>
+              <a:rPr lang="mr-IN" dirty="0">
+                <a:latin typeface="Menlo" charset="0"/>
+              </a:rPr>
+              <a:t>": "</a:t>
+            </a:r>
+            <a:r>
+              <a:rPr lang="mr-IN" dirty="0" err="1">
+                <a:latin typeface="Menlo" charset="0"/>
+              </a:rPr>
+              <a:t>string</a:t>
+            </a:r>
+            <a:r>
+              <a:rPr lang="mr-IN" dirty="0">
+                <a:latin typeface="Menlo" charset="0"/>
+              </a:rPr>
+              <a:t>"</a:t>
+            </a:r>
+          </a:p>
+          <a:p>
+            <a:r>
+              <a:rPr lang="mr-IN" dirty="0">
+                <a:latin typeface="Menlo" charset="0"/>
+              </a:rPr>
+              <a:t>},</a:t>
+            </a:r>
+          </a:p>
+        </p:txBody>
+      </p:sp>
+      <p:sp>
+        <p:nvSpPr>
+          <p:cNvPr id="5" name="Rectangle 4"/>
+          <p:cNvSpPr/>
+          <p:nvPr/>
+        </p:nvSpPr>
+        <p:spPr>
+          <a:xfrm>
+            <a:off x="4500748" y="1911260"/>
+            <a:ext cx="3111335" cy="3416320"/>
+          </a:xfrm>
+          <a:prstGeom prst="rect">
+            <a:avLst/>
+          </a:prstGeom>
+        </p:spPr>
+        <p:txBody>
+          <a:bodyPr wrap="square">
+            <a:spAutoFit/>
+          </a:bodyPr>
+          <a:lstStyle/>
+          <a:p>
+            <a:r>
+              <a:rPr lang="en-US" dirty="0">
+                <a:latin typeface="Menlo" charset="0"/>
+              </a:rPr>
+              <a:t>"</a:t>
+            </a:r>
+            <a:r>
+              <a:rPr lang="en-US" dirty="0">
+                <a:solidFill>
+                  <a:srgbClr val="FF0000"/>
+                </a:solidFill>
+                <a:latin typeface="Menlo" charset="0"/>
+              </a:rPr>
+              <a:t>optional</a:t>
+            </a:r>
+            <a:r>
+              <a:rPr lang="en-US" dirty="0">
+                <a:latin typeface="Menlo" charset="0"/>
+              </a:rPr>
+              <a:t>": {</a:t>
+            </a:r>
+          </a:p>
+          <a:p>
+            <a:r>
+              <a:rPr lang="en-US" dirty="0">
+                <a:latin typeface="Menlo" charset="0"/>
+              </a:rPr>
+              <a:t>  "type": </a:t>
+            </a:r>
+            <a:r>
+              <a:rPr lang="en-US" dirty="0" err="1">
+                <a:latin typeface="Menlo" charset="0"/>
+              </a:rPr>
+              <a:t>boolean</a:t>
+            </a:r>
+            <a:r>
+              <a:rPr lang="en-US" dirty="0">
+                <a:latin typeface="Menlo" charset="0"/>
+              </a:rPr>
+              <a:t>"</a:t>
+            </a:r>
+          </a:p>
+          <a:p>
+            <a:r>
+              <a:rPr lang="en-US" dirty="0">
+                <a:latin typeface="Menlo" charset="0"/>
+              </a:rPr>
+              <a:t>{</a:t>
+            </a:r>
+          </a:p>
+          <a:p>
+            <a:r>
+              <a:rPr lang="mr-IN" dirty="0">
+                <a:latin typeface="Menlo" charset="0"/>
+              </a:rPr>
+              <a:t>"</a:t>
+            </a:r>
+            <a:r>
+              <a:rPr lang="mr-IN" dirty="0" err="1">
+                <a:solidFill>
+                  <a:srgbClr val="FF0000"/>
+                </a:solidFill>
+                <a:latin typeface="Menlo" charset="0"/>
+              </a:rPr>
+              <a:t>extends</a:t>
+            </a:r>
+            <a:r>
+              <a:rPr lang="mr-IN" dirty="0">
+                <a:latin typeface="Menlo" charset="0"/>
+              </a:rPr>
+              <a:t>": {</a:t>
+            </a:r>
+          </a:p>
+          <a:p>
+            <a:r>
+              <a:rPr lang="en-US" dirty="0">
+                <a:latin typeface="Menlo" charset="0"/>
+              </a:rPr>
+              <a:t>  </a:t>
+            </a:r>
+            <a:r>
+              <a:rPr lang="mr-IN" dirty="0">
+                <a:latin typeface="Menlo" charset="0"/>
+              </a:rPr>
+              <a:t>"</a:t>
+            </a:r>
+            <a:r>
+              <a:rPr lang="mr-IN" dirty="0" err="1">
+                <a:latin typeface="Menlo" charset="0"/>
+              </a:rPr>
+              <a:t>type</a:t>
+            </a:r>
+            <a:r>
+              <a:rPr lang="mr-IN" dirty="0">
+                <a:latin typeface="Menlo" charset="0"/>
+              </a:rPr>
+              <a:t>": "</a:t>
+            </a:r>
+            <a:r>
+              <a:rPr lang="mr-IN" dirty="0" err="1">
+                <a:latin typeface="Menlo" charset="0"/>
+              </a:rPr>
+              <a:t>string</a:t>
+            </a:r>
+            <a:r>
+              <a:rPr lang="mr-IN" dirty="0">
+                <a:latin typeface="Menlo" charset="0"/>
+              </a:rPr>
+              <a:t>"</a:t>
+            </a:r>
+          </a:p>
+          <a:p>
+            <a:r>
+              <a:rPr lang="mr-IN" dirty="0">
+                <a:latin typeface="Menlo" charset="0"/>
+              </a:rPr>
+              <a:t>},</a:t>
+            </a:r>
+          </a:p>
+          <a:p>
+            <a:r>
+              <a:rPr lang="mr-IN" dirty="0">
+                <a:latin typeface="Menlo" charset="0"/>
+              </a:rPr>
+              <a:t>"</a:t>
+            </a:r>
+            <a:r>
+              <a:rPr lang="mr-IN" dirty="0" err="1">
+                <a:solidFill>
+                  <a:srgbClr val="FF0000"/>
+                </a:solidFill>
+                <a:latin typeface="Menlo" charset="0"/>
+              </a:rPr>
+              <a:t>refines</a:t>
+            </a:r>
+            <a:r>
+              <a:rPr lang="mr-IN" dirty="0">
+                <a:latin typeface="Menlo" charset="0"/>
+              </a:rPr>
+              <a:t>": {</a:t>
+            </a:r>
+          </a:p>
+          <a:p>
+            <a:r>
+              <a:rPr lang="en-US" dirty="0">
+                <a:latin typeface="Menlo" charset="0"/>
+              </a:rPr>
+              <a:t>  </a:t>
+            </a:r>
+            <a:r>
+              <a:rPr lang="mr-IN" dirty="0">
+                <a:latin typeface="Menlo" charset="0"/>
+              </a:rPr>
+              <a:t>"</a:t>
+            </a:r>
+            <a:r>
+              <a:rPr lang="mr-IN" dirty="0" err="1">
+                <a:latin typeface="Menlo" charset="0"/>
+              </a:rPr>
+              <a:t>type</a:t>
+            </a:r>
+            <a:r>
+              <a:rPr lang="mr-IN" dirty="0">
+                <a:latin typeface="Menlo" charset="0"/>
+              </a:rPr>
+              <a:t>": </a:t>
+            </a:r>
+            <a:r>
+              <a:rPr lang="mr-IN" dirty="0" smtClean="0">
+                <a:latin typeface="Menlo" charset="0"/>
+              </a:rPr>
+              <a:t>"</a:t>
+            </a:r>
+            <a:r>
+              <a:rPr lang="en-US" dirty="0" smtClean="0">
+                <a:latin typeface="Menlo" charset="0"/>
+              </a:rPr>
+              <a:t>object</a:t>
+            </a:r>
+            <a:r>
+              <a:rPr lang="mr-IN" dirty="0" smtClean="0">
+                <a:latin typeface="Menlo" charset="0"/>
+              </a:rPr>
+              <a:t>"</a:t>
+            </a:r>
+            <a:endParaRPr lang="mr-IN" dirty="0">
+              <a:latin typeface="Menlo" charset="0"/>
+            </a:endParaRPr>
+          </a:p>
+          <a:p>
+            <a:r>
+              <a:rPr lang="mr-IN" dirty="0">
+                <a:latin typeface="Menlo" charset="0"/>
+              </a:rPr>
+              <a:t>},</a:t>
+            </a:r>
+          </a:p>
+          <a:p>
+            <a:r>
+              <a:rPr lang="mr-IN" dirty="0">
+                <a:latin typeface="Menlo" charset="0"/>
+              </a:rPr>
+              <a:t>"</a:t>
+            </a:r>
+            <a:r>
+              <a:rPr lang="mr-IN" dirty="0" err="1">
+                <a:solidFill>
+                  <a:srgbClr val="FF0000"/>
+                </a:solidFill>
+                <a:latin typeface="Menlo" charset="0"/>
+              </a:rPr>
+              <a:t>includes</a:t>
+            </a:r>
+            <a:r>
+              <a:rPr lang="mr-IN" dirty="0">
+                <a:latin typeface="Menlo" charset="0"/>
+              </a:rPr>
+              <a:t>": {</a:t>
+            </a:r>
+          </a:p>
+          <a:p>
+            <a:r>
+              <a:rPr lang="en-US" dirty="0">
+                <a:latin typeface="Menlo" charset="0"/>
+              </a:rPr>
+              <a:t>  </a:t>
+            </a:r>
+            <a:r>
+              <a:rPr lang="mr-IN" dirty="0">
+                <a:latin typeface="Menlo" charset="0"/>
+              </a:rPr>
+              <a:t>"</a:t>
+            </a:r>
+            <a:r>
+              <a:rPr lang="mr-IN" dirty="0" err="1">
+                <a:latin typeface="Menlo" charset="0"/>
+              </a:rPr>
+              <a:t>type</a:t>
+            </a:r>
+            <a:r>
+              <a:rPr lang="mr-IN" dirty="0">
+                <a:latin typeface="Menlo" charset="0"/>
+              </a:rPr>
+              <a:t>": </a:t>
+            </a:r>
+            <a:r>
+              <a:rPr lang="mr-IN" dirty="0" smtClean="0">
+                <a:latin typeface="Menlo" charset="0"/>
+              </a:rPr>
+              <a:t>"</a:t>
+            </a:r>
+            <a:r>
+              <a:rPr lang="en-US" dirty="0" smtClean="0">
+                <a:latin typeface="Menlo" charset="0"/>
+              </a:rPr>
+              <a:t>array</a:t>
+            </a:r>
+            <a:r>
+              <a:rPr lang="mr-IN" dirty="0" smtClean="0">
+                <a:latin typeface="Menlo" charset="0"/>
+              </a:rPr>
+              <a:t>"</a:t>
+            </a:r>
+            <a:endParaRPr lang="mr-IN" dirty="0">
+              <a:latin typeface="Menlo" charset="0"/>
+            </a:endParaRPr>
+          </a:p>
+          <a:p>
+            <a:r>
+              <a:rPr lang="mr-IN" dirty="0">
+                <a:latin typeface="Menlo" charset="0"/>
+              </a:rPr>
+              <a:t>},</a:t>
+            </a:r>
           </a:p>
         </p:txBody>
       </p:sp>
@@ -9347,7 +10645,7 @@
           <p:cNvPr id="2" name="Title 1">
             <a:extLst>
               <a:ext uri="{FF2B5EF4-FFF2-40B4-BE49-F238E27FC236}">
-                <a16:creationId xmlns:a16="http://schemas.microsoft.com/office/drawing/2014/main" id="{D549081A-EA8B-4746-96C9-75A71DFF8FB4}"/>
+                <a16:creationId xmlns:a16="http://schemas.microsoft.com/office/drawing/2014/main" xmlns="" id="{D549081A-EA8B-4746-96C9-75A71DFF8FB4}"/>
               </a:ext>
             </a:extLst>
           </p:cNvPr>
@@ -9375,7 +10673,7 @@
           <p:cNvPr id="3" name="Content Placeholder 2">
             <a:extLst>
               <a:ext uri="{FF2B5EF4-FFF2-40B4-BE49-F238E27FC236}">
-                <a16:creationId xmlns:a16="http://schemas.microsoft.com/office/drawing/2014/main" id="{DCACBC9F-CF95-6D43-88DA-47B02495AD27}"/>
+                <a16:creationId xmlns:a16="http://schemas.microsoft.com/office/drawing/2014/main" xmlns="" id="{DCACBC9F-CF95-6D43-88DA-47B02495AD27}"/>
               </a:ext>
             </a:extLst>
           </p:cNvPr>
@@ -9469,7 +10767,7 @@
           <p:cNvPr id="2" name="Title 1">
             <a:extLst>
               <a:ext uri="{FF2B5EF4-FFF2-40B4-BE49-F238E27FC236}">
-                <a16:creationId xmlns:a16="http://schemas.microsoft.com/office/drawing/2014/main" id="{0A17F97D-CF29-1248-A799-ACA4F42DA52F}"/>
+                <a16:creationId xmlns:a16="http://schemas.microsoft.com/office/drawing/2014/main" xmlns="" id="{0A17F97D-CF29-1248-A799-ACA4F42DA52F}"/>
               </a:ext>
             </a:extLst>
           </p:cNvPr>
@@ -9492,9 +10790,10 @@
           <a:p>
             <a:pPr algn="r"/>
             <a:r>
-              <a:rPr lang="en-US" dirty="0"/>
-              <a:t>Thing Definition Language</a:t>
-            </a:r>
+              <a:rPr lang="en-US" dirty="0" smtClean="0"/>
+              <a:t>Simple Definition Format</a:t>
+            </a:r>
+            <a:endParaRPr lang="en-US" dirty="0"/>
           </a:p>
         </p:txBody>
       </p:sp>
@@ -9503,7 +10802,7 @@
           <p:cNvPr id="4" name="Rectangle 3">
             <a:extLst>
               <a:ext uri="{FF2B5EF4-FFF2-40B4-BE49-F238E27FC236}">
-                <a16:creationId xmlns:a16="http://schemas.microsoft.com/office/drawing/2014/main" id="{7D9D60DE-CC07-864F-ADAE-4760E5791BB0}"/>
+                <a16:creationId xmlns:a16="http://schemas.microsoft.com/office/drawing/2014/main" xmlns="" id="{7D9D60DE-CC07-864F-ADAE-4760E5791BB0}"/>
               </a:ext>
             </a:extLst>
           </p:cNvPr>

</xml_diff>